<commit_message>
Biztonsagi -ppt, pkt javítas
</commit_message>
<xml_diff>
--- a/F5 team bemutató.pptx
+++ b/F5 team bemutató.pptx
@@ -3005,6 +3005,188 @@
           </a:prstGeom>
         </p:spPr>
       </p:pic>
+      <p:pic>
+        <p:nvPicPr>
+          <p:cNvPr id="5" name="Kép 4" descr="A képen szöveg látható&#10;&#10;Automatikusan generált leírás">
+            <a:extLst>
+              <a:ext uri="{FF2B5EF4-FFF2-40B4-BE49-F238E27FC236}">
+                <a16:creationId xmlns:a16="http://schemas.microsoft.com/office/drawing/2014/main" id="{995C74D5-A2F3-2314-5958-B977015B8946}"/>
+              </a:ext>
+            </a:extLst>
+          </p:cNvPr>
+          <p:cNvPicPr>
+            <a:picLocks noChangeAspect="1"/>
+          </p:cNvPicPr>
+          <p:nvPr/>
+        </p:nvPicPr>
+        <p:blipFill>
+          <a:blip r:embed="rId3"/>
+          <a:stretch>
+            <a:fillRect/>
+          </a:stretch>
+        </p:blipFill>
+        <p:spPr>
+          <a:xfrm>
+            <a:off x="990089" y="2413337"/>
+            <a:ext cx="2172003" cy="1971950"/>
+          </a:xfrm>
+          <a:prstGeom prst="rect">
+            <a:avLst/>
+          </a:prstGeom>
+        </p:spPr>
+      </p:pic>
+      <p:sp>
+        <p:nvSpPr>
+          <p:cNvPr id="6" name="Szövegdoboz 5">
+            <a:extLst>
+              <a:ext uri="{FF2B5EF4-FFF2-40B4-BE49-F238E27FC236}">
+                <a16:creationId xmlns:a16="http://schemas.microsoft.com/office/drawing/2014/main" id="{393832EE-983E-956B-E72D-32C9A8FB4DA9}"/>
+              </a:ext>
+            </a:extLst>
+          </p:cNvPr>
+          <p:cNvSpPr txBox="1"/>
+          <p:nvPr/>
+        </p:nvSpPr>
+        <p:spPr>
+          <a:xfrm>
+            <a:off x="4632386" y="1469264"/>
+            <a:ext cx="6349041" cy="2862322"/>
+          </a:xfrm>
+          <a:prstGeom prst="rect">
+            <a:avLst/>
+          </a:prstGeom>
+          <a:noFill/>
+        </p:spPr>
+        <p:txBody>
+          <a:bodyPr wrap="square" rtlCol="0">
+            <a:spAutoFit/>
+          </a:bodyPr>
+          <a:lstStyle/>
+          <a:p>
+            <a:r>
+              <a:rPr lang="hu-HU" dirty="0"/>
+              <a:t>1. A biztonság nálunk a legfontosabb, ezért minden jelszót a hálózati eszközökön </a:t>
+            </a:r>
+            <a:r>
+              <a:rPr lang="hu-HU" dirty="0" err="1"/>
+              <a:t>titkosítunk</a:t>
+            </a:r>
+            <a:r>
+              <a:rPr lang="hu-HU" dirty="0"/>
+              <a:t>.</a:t>
+            </a:r>
+          </a:p>
+          <a:p>
+            <a:r>
+              <a:rPr lang="hu-HU" dirty="0"/>
+              <a:t>2. A jelszókat csak a illetékes rendszergazdával osztunk meg.</a:t>
+            </a:r>
+          </a:p>
+          <a:p>
+            <a:r>
+              <a:rPr lang="hu-HU" dirty="0"/>
+              <a:t>3. Mindent szerveren tárolunk és havi szintű másolatokat készítünk hálózati információkról/</a:t>
+            </a:r>
+            <a:r>
+              <a:rPr lang="hu-HU"/>
+              <a:t>statisztikáról.</a:t>
+            </a:r>
+            <a:endParaRPr lang="hu-HU" dirty="0"/>
+          </a:p>
+          <a:p>
+            <a:r>
+              <a:rPr lang="hu-HU" dirty="0"/>
+              <a:t>4. </a:t>
+            </a:r>
+            <a:r>
+              <a:rPr lang="hu-HU" b="0" i="0" dirty="0" err="1">
+                <a:effectLst/>
+                <a:latin typeface="Segoe UI Historic" panose="020B0502040204020203" pitchFamily="34" charset="0"/>
+              </a:rPr>
+              <a:t>Secure</a:t>
+            </a:r>
+            <a:r>
+              <a:rPr lang="hu-HU" b="0" i="0" dirty="0">
+                <a:effectLst/>
+                <a:latin typeface="Segoe UI Historic" panose="020B0502040204020203" pitchFamily="34" charset="0"/>
+              </a:rPr>
+              <a:t> Shell (SSH) Az SSH a javasolt sávon belüli módszer, hogy a hálózaton keresztül, virtuális interfész segítségével biztonságos parancssoros kapcsolatot létesítsünk.</a:t>
+            </a:r>
+          </a:p>
+          <a:p>
+            <a:r>
+              <a:rPr lang="hu-HU" dirty="0">
+                <a:latin typeface="Segoe UI Historic" panose="020B0502040204020203" pitchFamily="34" charset="0"/>
+              </a:rPr>
+              <a:t>Így ez által megvédjük a hálózatot az illetéktelen hozzáférésektől.</a:t>
+            </a:r>
+            <a:endParaRPr lang="hu-HU" b="0" i="0" dirty="0">
+              <a:effectLst/>
+              <a:latin typeface="Segoe UI Historic" panose="020B0502040204020203" pitchFamily="34" charset="0"/>
+            </a:endParaRPr>
+          </a:p>
+        </p:txBody>
+      </p:sp>
+      <p:pic>
+        <p:nvPicPr>
+          <p:cNvPr id="8" name="Kép 7">
+            <a:extLst>
+              <a:ext uri="{FF2B5EF4-FFF2-40B4-BE49-F238E27FC236}">
+                <a16:creationId xmlns:a16="http://schemas.microsoft.com/office/drawing/2014/main" id="{DA7529BD-3045-72E0-4730-55894BF1425B}"/>
+              </a:ext>
+            </a:extLst>
+          </p:cNvPr>
+          <p:cNvPicPr>
+            <a:picLocks noChangeAspect="1"/>
+          </p:cNvPicPr>
+          <p:nvPr/>
+        </p:nvPicPr>
+        <p:blipFill>
+          <a:blip r:embed="rId4"/>
+          <a:stretch>
+            <a:fillRect/>
+          </a:stretch>
+        </p:blipFill>
+        <p:spPr>
+          <a:xfrm>
+            <a:off x="2576855" y="5388736"/>
+            <a:ext cx="6537957" cy="640080"/>
+          </a:xfrm>
+          <a:prstGeom prst="rect">
+            <a:avLst/>
+          </a:prstGeom>
+        </p:spPr>
+      </p:pic>
+      <p:pic>
+        <p:nvPicPr>
+          <p:cNvPr id="10" name="Kép 9">
+            <a:extLst>
+              <a:ext uri="{FF2B5EF4-FFF2-40B4-BE49-F238E27FC236}">
+                <a16:creationId xmlns:a16="http://schemas.microsoft.com/office/drawing/2014/main" id="{8464C41B-966E-0850-9F4B-132EEC0AD4E5}"/>
+              </a:ext>
+            </a:extLst>
+          </p:cNvPr>
+          <p:cNvPicPr>
+            <a:picLocks noChangeAspect="1"/>
+          </p:cNvPicPr>
+          <p:nvPr/>
+        </p:nvPicPr>
+        <p:blipFill>
+          <a:blip r:embed="rId5"/>
+          <a:stretch>
+            <a:fillRect/>
+          </a:stretch>
+        </p:blipFill>
+        <p:spPr>
+          <a:xfrm>
+            <a:off x="990089" y="1721632"/>
+            <a:ext cx="3296110" cy="257211"/>
+          </a:xfrm>
+          <a:prstGeom prst="rect">
+            <a:avLst/>
+          </a:prstGeom>
+        </p:spPr>
+      </p:pic>
     </p:spTree>
     <p:extLst>
       <p:ext uri="{BB962C8B-B14F-4D97-AF65-F5344CB8AC3E}">
@@ -4535,12 +4717,12 @@
           <a:graphicData uri="http://schemas.openxmlformats.org/presentationml/2006/ole">
             <mc:AlternateContent xmlns:mc="http://schemas.openxmlformats.org/markup-compatibility/2006">
               <mc:Choice xmlns:v="urn:schemas-microsoft-com:vml" Requires="v">
-                <p:oleObj spid="_x0000_s1036" name="Document" r:id="rId4" imgW="5880988" imgH="8106644" progId="Word.Document.12">
+                <p:oleObj name="Document" r:id="rId3" imgW="5880988" imgH="8106644" progId="Word.Document.12">
                   <p:embed/>
                 </p:oleObj>
               </mc:Choice>
               <mc:Fallback>
-                <p:oleObj name="Document" r:id="rId4" imgW="5880988" imgH="8106644" progId="Word.Document.12">
+                <p:oleObj name="Document" r:id="rId3" imgW="5880988" imgH="8106644" progId="Word.Document.12">
                   <p:embed/>
                   <p:pic>
                     <p:nvPicPr>
@@ -4549,7 +4731,7 @@
                       <p:nvPr/>
                     </p:nvPicPr>
                     <p:blipFill>
-                      <a:blip r:embed="rId5"/>
+                      <a:blip r:embed="rId4"/>
                       <a:stretch>
                         <a:fillRect/>
                       </a:stretch>
@@ -4604,7 +4786,7 @@
             </a:r>
             <a:r>
               <a:rPr lang="hu-HU" dirty="0">
-                <a:hlinkClick r:id="rId6"/>
+                <a:hlinkClick r:id="rId5"/>
               </a:rPr>
               <a:t>https://trello.com/c/ADXocAfD</a:t>
             </a:r>
@@ -4630,7 +4812,7 @@
           <p:nvPr/>
         </p:nvPicPr>
         <p:blipFill>
-          <a:blip r:embed="rId7"/>
+          <a:blip r:embed="rId6"/>
           <a:stretch>
             <a:fillRect/>
           </a:stretch>
@@ -5891,6 +6073,15 @@
 </file>
 
 <file path=customXml/item1.xml><?xml version="1.0" encoding="utf-8"?>
+<p:properties xmlns:p="http://schemas.microsoft.com/office/2006/metadata/properties" xmlns:xsi="http://www.w3.org/2001/XMLSchema-instance" xmlns:pc="http://schemas.microsoft.com/office/infopath/2007/PartnerControls">
+  <documentManagement>
+    <Status xmlns="71af3243-3dd4-4a8d-8c0d-dd76da1f02a5">Not started</Status>
+    <MediaServiceKeyPoints xmlns="71af3243-3dd4-4a8d-8c0d-dd76da1f02a5" xsi:nil="true"/>
+  </documentManagement>
+</p:properties>
+</file>
+
+<file path=customXml/item2.xml><?xml version="1.0" encoding="utf-8"?>
 <ct:contentTypeSchema xmlns:ct="http://schemas.microsoft.com/office/2006/metadata/contentType" xmlns:ma="http://schemas.microsoft.com/office/2006/metadata/properties/metaAttributes" ct:_="" ma:_="" ma:contentTypeName="Document" ma:contentTypeID="0x01010079F111ED35F8CC479449609E8A0923A6" ma:contentTypeVersion="12" ma:contentTypeDescription="Create a new document." ma:contentTypeScope="" ma:versionID="a8a52e8c320b9a064ae3583ae3861c92">
   <xsd:schema xmlns:xsd="http://www.w3.org/2001/XMLSchema" xmlns:xs="http://www.w3.org/2001/XMLSchema" xmlns:p="http://schemas.microsoft.com/office/2006/metadata/properties" xmlns:ns2="71af3243-3dd4-4a8d-8c0d-dd76da1f02a5" xmlns:ns3="16c05727-aa75-4e4a-9b5f-8a80a1165891" targetNamespace="http://schemas.microsoft.com/office/2006/metadata/properties" ma:root="true" ma:fieldsID="88020cb39231a0945110f9cd888b521a" ns2:_="" ns3:_="">
     <xsd:import namespace="71af3243-3dd4-4a8d-8c0d-dd76da1f02a5"/>
@@ -6111,15 +6302,6 @@
 </ct:contentTypeSchema>
 </file>
 
-<file path=customXml/item2.xml><?xml version="1.0" encoding="utf-8"?>
-<p:properties xmlns:p="http://schemas.microsoft.com/office/2006/metadata/properties" xmlns:xsi="http://www.w3.org/2001/XMLSchema-instance" xmlns:pc="http://schemas.microsoft.com/office/infopath/2007/PartnerControls">
-  <documentManagement>
-    <Status xmlns="71af3243-3dd4-4a8d-8c0d-dd76da1f02a5">Not started</Status>
-    <MediaServiceKeyPoints xmlns="71af3243-3dd4-4a8d-8c0d-dd76da1f02a5" xsi:nil="true"/>
-  </documentManagement>
-</p:properties>
-</file>
-
 <file path=customXml/item3.xml><?xml version="1.0" encoding="utf-8"?>
 <?mso-contentType ?>
 <FormTemplates xmlns="http://schemas.microsoft.com/sharepoint/v3/contenttype/forms">
@@ -6130,6 +6312,23 @@
 </file>
 
 <file path=customXml/itemProps1.xml><?xml version="1.0" encoding="utf-8"?>
+<ds:datastoreItem xmlns:ds="http://schemas.openxmlformats.org/officeDocument/2006/customXml" ds:itemID="{950072C5-DDE0-4258-BA7A-4D4B80DFA632}">
+  <ds:schemaRefs>
+    <ds:schemaRef ds:uri="http://schemas.microsoft.com/office/2006/documentManagement/types"/>
+    <ds:schemaRef ds:uri="http://schemas.openxmlformats.org/package/2006/metadata/core-properties"/>
+    <ds:schemaRef ds:uri="16c05727-aa75-4e4a-9b5f-8a80a1165891"/>
+    <ds:schemaRef ds:uri="http://purl.org/dc/dcmitype/"/>
+    <ds:schemaRef ds:uri="http://schemas.microsoft.com/office/infopath/2007/PartnerControls"/>
+    <ds:schemaRef ds:uri="http://purl.org/dc/elements/1.1/"/>
+    <ds:schemaRef ds:uri="http://schemas.microsoft.com/office/2006/metadata/properties"/>
+    <ds:schemaRef ds:uri="71af3243-3dd4-4a8d-8c0d-dd76da1f02a5"/>
+    <ds:schemaRef ds:uri="http://www.w3.org/XML/1998/namespace"/>
+    <ds:schemaRef ds:uri="http://purl.org/dc/terms/"/>
+  </ds:schemaRefs>
+</ds:datastoreItem>
+</file>
+
+<file path=customXml/itemProps2.xml><?xml version="1.0" encoding="utf-8"?>
 <ds:datastoreItem xmlns:ds="http://schemas.openxmlformats.org/officeDocument/2006/customXml" ds:itemID="{FD7FC771-7DFE-49DA-B577-71181BFBCB2E}">
   <ds:schemaRefs>
     <ds:schemaRef ds:uri="http://schemas.microsoft.com/office/2006/metadata/contentType"/>
@@ -6148,23 +6347,6 @@
 </ds:datastoreItem>
 </file>
 
-<file path=customXml/itemProps2.xml><?xml version="1.0" encoding="utf-8"?>
-<ds:datastoreItem xmlns:ds="http://schemas.openxmlformats.org/officeDocument/2006/customXml" ds:itemID="{950072C5-DDE0-4258-BA7A-4D4B80DFA632}">
-  <ds:schemaRefs>
-    <ds:schemaRef ds:uri="http://schemas.microsoft.com/office/2006/documentManagement/types"/>
-    <ds:schemaRef ds:uri="http://schemas.openxmlformats.org/package/2006/metadata/core-properties"/>
-    <ds:schemaRef ds:uri="16c05727-aa75-4e4a-9b5f-8a80a1165891"/>
-    <ds:schemaRef ds:uri="http://purl.org/dc/dcmitype/"/>
-    <ds:schemaRef ds:uri="http://schemas.microsoft.com/office/infopath/2007/PartnerControls"/>
-    <ds:schemaRef ds:uri="http://purl.org/dc/elements/1.1/"/>
-    <ds:schemaRef ds:uri="http://schemas.microsoft.com/office/2006/metadata/properties"/>
-    <ds:schemaRef ds:uri="71af3243-3dd4-4a8d-8c0d-dd76da1f02a5"/>
-    <ds:schemaRef ds:uri="http://www.w3.org/XML/1998/namespace"/>
-    <ds:schemaRef ds:uri="http://purl.org/dc/terms/"/>
-  </ds:schemaRefs>
-</ds:datastoreItem>
-</file>
-
 <file path=customXml/itemProps3.xml><?xml version="1.0" encoding="utf-8"?>
 <ds:datastoreItem xmlns:ds="http://schemas.openxmlformats.org/officeDocument/2006/customXml" ds:itemID="{7EE8C63A-4744-4DE4-BB49-0FF0B5375C60}">
   <ds:schemaRefs>

</xml_diff>